<commit_message>
adding PP for presentation
</commit_message>
<xml_diff>
--- a/CS3200 Project - MusicDB.pptx
+++ b/CS3200 Project - MusicDB.pptx
@@ -109,6 +109,11 @@
       </a:defRPr>
     </a:lvl9pPr>
   </p:defaultTextStyle>
+  <p:extLst>
+    <p:ext uri="{EFAFB233-063F-42B5-8137-9DF3F51BA10A}">
+      <p15:sldGuideLst xmlns:p15="http://schemas.microsoft.com/office/powerpoint/2012/main"/>
+    </p:ext>
+  </p:extLst>
 </p:presentation>
 </file>
 
@@ -298,7 +303,7 @@
           <a:p>
             <a:fld id="{09710987-E4FA-4C22-9266-5FB1F9027D6B}" type="datetimeFigureOut">
               <a:rPr lang="en-US" smtClean="0"/>
-              <a:t>4/19/2016</a:t>
+              <a:t>4/20/2016</a:t>
             </a:fld>
             <a:endParaRPr lang="en-US"/>
           </a:p>
@@ -573,7 +578,7 @@
           <a:p>
             <a:fld id="{09710987-E4FA-4C22-9266-5FB1F9027D6B}" type="datetimeFigureOut">
               <a:rPr lang="en-US" smtClean="0"/>
-              <a:t>4/19/2016</a:t>
+              <a:t>4/20/2016</a:t>
             </a:fld>
             <a:endParaRPr lang="en-US"/>
           </a:p>
@@ -767,7 +772,7 @@
           <a:p>
             <a:fld id="{09710987-E4FA-4C22-9266-5FB1F9027D6B}" type="datetimeFigureOut">
               <a:rPr lang="en-US" smtClean="0"/>
-              <a:t>4/19/2016</a:t>
+              <a:t>4/20/2016</a:t>
             </a:fld>
             <a:endParaRPr lang="en-US"/>
           </a:p>
@@ -1040,7 +1045,7 @@
           <a:p>
             <a:fld id="{09710987-E4FA-4C22-9266-5FB1F9027D6B}" type="datetimeFigureOut">
               <a:rPr lang="en-US" smtClean="0"/>
-              <a:t>4/19/2016</a:t>
+              <a:t>4/20/2016</a:t>
             </a:fld>
             <a:endParaRPr lang="en-US"/>
           </a:p>
@@ -1381,7 +1386,7 @@
           <a:p>
             <a:fld id="{09710987-E4FA-4C22-9266-5FB1F9027D6B}" type="datetimeFigureOut">
               <a:rPr lang="en-US" smtClean="0"/>
-              <a:t>4/19/2016</a:t>
+              <a:t>4/20/2016</a:t>
             </a:fld>
             <a:endParaRPr lang="en-US"/>
           </a:p>
@@ -2004,7 +2009,7 @@
           <a:p>
             <a:fld id="{09710987-E4FA-4C22-9266-5FB1F9027D6B}" type="datetimeFigureOut">
               <a:rPr lang="en-US" smtClean="0"/>
-              <a:t>4/19/2016</a:t>
+              <a:t>4/20/2016</a:t>
             </a:fld>
             <a:endParaRPr lang="en-US"/>
           </a:p>
@@ -2864,7 +2869,7 @@
           <a:p>
             <a:fld id="{09710987-E4FA-4C22-9266-5FB1F9027D6B}" type="datetimeFigureOut">
               <a:rPr lang="en-US" smtClean="0"/>
-              <a:t>4/19/2016</a:t>
+              <a:t>4/20/2016</a:t>
             </a:fld>
             <a:endParaRPr lang="en-US"/>
           </a:p>
@@ -3034,7 +3039,7 @@
           <a:p>
             <a:fld id="{09710987-E4FA-4C22-9266-5FB1F9027D6B}" type="datetimeFigureOut">
               <a:rPr lang="en-US" smtClean="0"/>
-              <a:t>4/19/2016</a:t>
+              <a:t>4/20/2016</a:t>
             </a:fld>
             <a:endParaRPr lang="en-US"/>
           </a:p>
@@ -3214,7 +3219,7 @@
           <a:p>
             <a:fld id="{09710987-E4FA-4C22-9266-5FB1F9027D6B}" type="datetimeFigureOut">
               <a:rPr lang="en-US" smtClean="0"/>
-              <a:t>4/19/2016</a:t>
+              <a:t>4/20/2016</a:t>
             </a:fld>
             <a:endParaRPr lang="en-US"/>
           </a:p>
@@ -3384,7 +3389,7 @@
           <a:p>
             <a:fld id="{09710987-E4FA-4C22-9266-5FB1F9027D6B}" type="datetimeFigureOut">
               <a:rPr lang="en-US" smtClean="0"/>
-              <a:t>4/19/2016</a:t>
+              <a:t>4/20/2016</a:t>
             </a:fld>
             <a:endParaRPr lang="en-US"/>
           </a:p>
@@ -3631,7 +3636,7 @@
           <a:p>
             <a:fld id="{09710987-E4FA-4C22-9266-5FB1F9027D6B}" type="datetimeFigureOut">
               <a:rPr lang="en-US" smtClean="0"/>
-              <a:t>4/19/2016</a:t>
+              <a:t>4/20/2016</a:t>
             </a:fld>
             <a:endParaRPr lang="en-US"/>
           </a:p>
@@ -3923,7 +3928,7 @@
           <a:p>
             <a:fld id="{09710987-E4FA-4C22-9266-5FB1F9027D6B}" type="datetimeFigureOut">
               <a:rPr lang="en-US" smtClean="0"/>
-              <a:t>4/19/2016</a:t>
+              <a:t>4/20/2016</a:t>
             </a:fld>
             <a:endParaRPr lang="en-US"/>
           </a:p>
@@ -4367,7 +4372,7 @@
           <a:p>
             <a:fld id="{09710987-E4FA-4C22-9266-5FB1F9027D6B}" type="datetimeFigureOut">
               <a:rPr lang="en-US" smtClean="0"/>
-              <a:t>4/19/2016</a:t>
+              <a:t>4/20/2016</a:t>
             </a:fld>
             <a:endParaRPr lang="en-US"/>
           </a:p>
@@ -4485,7 +4490,7 @@
           <a:p>
             <a:fld id="{09710987-E4FA-4C22-9266-5FB1F9027D6B}" type="datetimeFigureOut">
               <a:rPr lang="en-US" smtClean="0"/>
-              <a:t>4/19/2016</a:t>
+              <a:t>4/20/2016</a:t>
             </a:fld>
             <a:endParaRPr lang="en-US"/>
           </a:p>
@@ -4580,7 +4585,7 @@
           <a:p>
             <a:fld id="{09710987-E4FA-4C22-9266-5FB1F9027D6B}" type="datetimeFigureOut">
               <a:rPr lang="en-US" smtClean="0"/>
-              <a:t>4/19/2016</a:t>
+              <a:t>4/20/2016</a:t>
             </a:fld>
             <a:endParaRPr lang="en-US"/>
           </a:p>
@@ -4859,7 +4864,7 @@
           <a:p>
             <a:fld id="{09710987-E4FA-4C22-9266-5FB1F9027D6B}" type="datetimeFigureOut">
               <a:rPr lang="en-US" smtClean="0"/>
-              <a:t>4/19/2016</a:t>
+              <a:t>4/20/2016</a:t>
             </a:fld>
             <a:endParaRPr lang="en-US"/>
           </a:p>
@@ -5134,7 +5139,7 @@
           <a:p>
             <a:fld id="{09710987-E4FA-4C22-9266-5FB1F9027D6B}" type="datetimeFigureOut">
               <a:rPr lang="en-US" smtClean="0"/>
-              <a:t>4/19/2016</a:t>
+              <a:t>4/20/2016</a:t>
             </a:fld>
             <a:endParaRPr lang="en-US"/>
           </a:p>
@@ -5563,7 +5568,7 @@
           <a:p>
             <a:fld id="{09710987-E4FA-4C22-9266-5FB1F9027D6B}" type="datetimeFigureOut">
               <a:rPr lang="en-US" smtClean="0"/>
-              <a:t>4/19/2016</a:t>
+              <a:t>4/20/2016</a:t>
             </a:fld>
             <a:endParaRPr lang="en-US"/>
           </a:p>
@@ -6128,36 +6133,83 @@
             <p:ph type="subTitle" idx="1"/>
           </p:nvPr>
         </p:nvSpPr>
-        <p:spPr/>
-        <p:txBody>
-          <a:bodyPr/>
-          <a:lstStyle/>
-          <a:p>
-            <a:r>
-              <a:rPr lang="en-US" dirty="0" smtClean="0"/>
-              <a:t>JAEJIN Lee, </a:t>
-            </a:r>
-            <a:r>
-              <a:rPr lang="en-US" dirty="0" err="1" smtClean="0"/>
-              <a:t>Duy</a:t>
-            </a:r>
-            <a:r>
-              <a:rPr lang="en-US" dirty="0" smtClean="0"/>
-              <a:t> vu, Nam </a:t>
-            </a:r>
-            <a:r>
-              <a:rPr lang="en-US" dirty="0" err="1" smtClean="0"/>
+        <p:spPr>
+          <a:xfrm>
+            <a:off x="1154955" y="4777379"/>
+            <a:ext cx="8825658" cy="1519903"/>
+          </a:xfrm>
+        </p:spPr>
+        <p:txBody>
+          <a:bodyPr>
+            <a:normAutofit/>
+          </a:bodyPr>
+          <a:lstStyle/>
+          <a:p>
+            <a:pPr algn="r"/>
+            <a:r>
+              <a:rPr lang="en-US" b="1" dirty="0">
+                <a:solidFill>
+                  <a:schemeClr val="tx1"/>
+                </a:solidFill>
+              </a:rPr>
+              <a:t>Nam </a:t>
+            </a:r>
+            <a:r>
+              <a:rPr lang="en-US" b="1" dirty="0" err="1">
+                <a:solidFill>
+                  <a:schemeClr val="tx1"/>
+                </a:solidFill>
+              </a:rPr>
               <a:t>nhat</a:t>
             </a:r>
             <a:r>
-              <a:rPr lang="en-US" dirty="0" smtClean="0"/>
+              <a:rPr lang="en-US" b="1" dirty="0">
+                <a:solidFill>
+                  <a:schemeClr val="tx1"/>
+                </a:solidFill>
+              </a:rPr>
               <a:t> </a:t>
             </a:r>
             <a:r>
-              <a:rPr lang="en-US" dirty="0" err="1" smtClean="0"/>
+              <a:rPr lang="en-US" b="1" dirty="0" err="1">
+                <a:solidFill>
+                  <a:schemeClr val="tx1"/>
+                </a:solidFill>
+              </a:rPr>
               <a:t>luu</a:t>
             </a:r>
-            <a:endParaRPr lang="en-US" dirty="0"/>
+            <a:endParaRPr lang="en-US" b="1" dirty="0">
+              <a:solidFill>
+                <a:schemeClr val="tx1"/>
+              </a:solidFill>
+            </a:endParaRPr>
+          </a:p>
+          <a:p>
+            <a:pPr algn="r"/>
+            <a:r>
+              <a:rPr lang="en-US" b="1" dirty="0" smtClean="0">
+                <a:solidFill>
+                  <a:schemeClr val="tx1"/>
+                </a:solidFill>
+              </a:rPr>
+              <a:t>JAEJIN Lee</a:t>
+            </a:r>
+          </a:p>
+          <a:p>
+            <a:pPr algn="r"/>
+            <a:r>
+              <a:rPr lang="en-US" b="1" dirty="0" smtClean="0">
+                <a:solidFill>
+                  <a:schemeClr val="tx1"/>
+                </a:solidFill>
+              </a:rPr>
+              <a:t>Duy vu</a:t>
+            </a:r>
+            <a:endParaRPr lang="en-US" b="1" dirty="0">
+              <a:solidFill>
+                <a:schemeClr val="tx1"/>
+              </a:solidFill>
+            </a:endParaRPr>
           </a:p>
         </p:txBody>
       </p:sp>
@@ -6243,23 +6295,36 @@
           <a:p>
             <a:r>
               <a:rPr lang="en-US" dirty="0" smtClean="0"/>
-              <a:t>In order to find one song, need to search on each online service</a:t>
-            </a:r>
-          </a:p>
-          <a:p>
+              <a:t>In order to find one song, need to search on each online </a:t>
+            </a:r>
             <a:r>
               <a:rPr lang="en-US" dirty="0" smtClean="0"/>
-              <a:t>Global music info catalog</a:t>
-            </a:r>
+              <a:t>service</a:t>
+            </a:r>
+          </a:p>
+          <a:p>
+            <a:r>
+              <a:rPr lang="en-US" b="1" dirty="0" smtClean="0"/>
+              <a:t>Even then, your library info are separated into multiple accounts</a:t>
+            </a:r>
+            <a:endParaRPr lang="en-US" b="1" dirty="0" smtClean="0"/>
+          </a:p>
+          <a:p>
+            <a:pPr marL="0" indent="0">
+              <a:buNone/>
+            </a:pPr>
+            <a:endParaRPr lang="en-US" dirty="0" smtClean="0"/>
           </a:p>
           <a:p>
             <a:endParaRPr lang="en-US" dirty="0"/>
           </a:p>
           <a:p>
-            <a:r>
-              <a:rPr lang="en-US" dirty="0" smtClean="0"/>
-              <a:t>Store library’s info, addition of telling us where we can find songs in library</a:t>
-            </a:r>
+            <a:pPr marL="0" indent="0">
+              <a:buNone/>
+            </a:pPr>
+            <a:endParaRPr lang="en-US" dirty="0" smtClean="0"/>
+          </a:p>
+          <a:p>
             <a:endParaRPr lang="en-US" dirty="0"/>
           </a:p>
         </p:txBody>
@@ -6333,8 +6398,21 @@
           <a:lstStyle/>
           <a:p>
             <a:r>
+              <a:rPr lang="en-US" b="1" dirty="0" smtClean="0"/>
+              <a:t>An IMDB for music</a:t>
+            </a:r>
+          </a:p>
+          <a:p>
+            <a:endParaRPr lang="en-US" dirty="0" smtClean="0"/>
+          </a:p>
+          <a:p>
+            <a:r>
               <a:rPr lang="en-US" dirty="0" smtClean="0"/>
-              <a:t>Web GUI interface</a:t>
+              <a:t>Web </a:t>
+            </a:r>
+            <a:r>
+              <a:rPr lang="en-US" dirty="0" smtClean="0"/>
+              <a:t>GUI interface</a:t>
             </a:r>
           </a:p>
           <a:p>
@@ -6346,8 +6424,31 @@
           <a:p>
             <a:r>
               <a:rPr lang="en-US" dirty="0" smtClean="0"/>
-              <a:t>Search, libraries, comment, like, rate song</a:t>
-            </a:r>
+              <a:t>Search for song on multiple music sources</a:t>
+            </a:r>
+          </a:p>
+          <a:p>
+            <a:r>
+              <a:rPr lang="en-US" dirty="0" smtClean="0"/>
+              <a:t>Add song to one single library</a:t>
+            </a:r>
+            <a:r>
+              <a:rPr lang="en-US" dirty="0" smtClean="0"/>
+              <a:t> </a:t>
+            </a:r>
+          </a:p>
+          <a:p>
+            <a:r>
+              <a:rPr lang="en-US" dirty="0" smtClean="0"/>
+              <a:t>Ability to create playlist of songs</a:t>
+            </a:r>
+          </a:p>
+          <a:p>
+            <a:r>
+              <a:rPr lang="en-US" dirty="0" smtClean="0"/>
+              <a:t>Comment/rate on songs in the library for others users to see</a:t>
+            </a:r>
+            <a:endParaRPr lang="en-US" dirty="0" smtClean="0"/>
           </a:p>
           <a:p>
             <a:endParaRPr lang="en-US" dirty="0"/>
@@ -6409,7 +6510,7 @@
       </p:sp>
       <p:pic>
         <p:nvPicPr>
-          <p:cNvPr id="4" name="Content Placeholder 3"/>
+          <p:cNvPr id="5" name="Content Placeholder 4"/>
           <p:cNvPicPr>
             <a:picLocks noGrp="1" noChangeAspect="1"/>
           </p:cNvPicPr>
@@ -6418,22 +6519,19 @@
           </p:nvPr>
         </p:nvPicPr>
         <p:blipFill>
-          <a:blip r:embed="rId2">
-            <a:extLst>
-              <a:ext uri="{28A0092B-C50C-407E-A947-70E740481C1C}">
-                <a14:useLocalDpi xmlns:a14="http://schemas.microsoft.com/office/drawing/2010/main" val="0"/>
-              </a:ext>
-            </a:extLst>
-          </a:blip>
+          <a:blip r:embed="rId2"/>
           <a:stretch>
             <a:fillRect/>
           </a:stretch>
         </p:blipFill>
         <p:spPr>
           <a:xfrm>
-            <a:off x="2550696" y="1878701"/>
-            <a:ext cx="6157754" cy="4979299"/>
+            <a:off x="1526875" y="1604512"/>
+            <a:ext cx="8906578" cy="4899804"/>
           </a:xfrm>
+          <a:prstGeom prst="rect">
+            <a:avLst/>
+          </a:prstGeom>
         </p:spPr>
       </p:pic>
     </p:spTree>
@@ -6506,15 +6604,17 @@
           <a:p>
             <a:r>
               <a:rPr lang="en-US" dirty="0" smtClean="0"/>
-              <a:t>Front end: </a:t>
-            </a:r>
-            <a:r>
-              <a:rPr lang="en-US" dirty="0" err="1" smtClean="0"/>
-              <a:t>AngularJS</a:t>
-            </a:r>
+              <a:t>MEAN Stack</a:t>
+            </a:r>
+          </a:p>
+          <a:p>
             <a:r>
               <a:rPr lang="en-US" dirty="0" smtClean="0"/>
-              <a:t>, HTML, CSS, </a:t>
+              <a:t>Front </a:t>
+            </a:r>
+            <a:r>
+              <a:rPr lang="en-US" dirty="0" smtClean="0"/>
+              <a:t>end: AngularJS, HTML, CSS, </a:t>
             </a:r>
             <a:r>
               <a:rPr lang="en-US" dirty="0" err="1" smtClean="0"/>
@@ -6536,21 +6636,49 @@
           <a:p>
             <a:r>
               <a:rPr lang="en-US" dirty="0" smtClean="0"/>
-              <a:t>Database: MySQL with use of </a:t>
+              <a:t>Database: </a:t>
+            </a:r>
+            <a:r>
+              <a:rPr lang="en-US" dirty="0" smtClean="0"/>
+              <a:t>MongoDB</a:t>
+            </a:r>
+            <a:endParaRPr lang="en-US" dirty="0" smtClean="0"/>
+          </a:p>
+          <a:p>
+            <a:r>
+              <a:rPr lang="en-US" dirty="0" smtClean="0"/>
+              <a:t>Spotify API for demo </a:t>
+            </a:r>
+            <a:r>
+              <a:rPr lang="en-US" dirty="0" smtClean="0"/>
+              <a:t>catalog</a:t>
+            </a:r>
+          </a:p>
+          <a:p>
+            <a:pPr marL="0" indent="0">
+              <a:buNone/>
+            </a:pPr>
+            <a:r>
+              <a:rPr lang="en-US" dirty="0"/>
+              <a:t>	</a:t>
+            </a:r>
+            <a:r>
+              <a:rPr lang="en-US" dirty="0" smtClean="0"/>
+              <a:t>(other sources can be integrated easily form the back end)</a:t>
+            </a:r>
+            <a:endParaRPr lang="en-US" dirty="0" smtClean="0"/>
+          </a:p>
+          <a:p>
+            <a:endParaRPr lang="en-US" dirty="0"/>
+          </a:p>
+          <a:p>
+            <a:r>
+              <a:rPr lang="en-US" dirty="0" smtClean="0"/>
+              <a:t>Hosted on </a:t>
             </a:r>
             <a:r>
               <a:rPr lang="en-US" dirty="0" err="1" smtClean="0"/>
-              <a:t>nodejs-mysql</a:t>
-            </a:r>
-            <a:r>
-              <a:rPr lang="en-US" dirty="0" smtClean="0"/>
-              <a:t> module</a:t>
-            </a:r>
-          </a:p>
-          <a:p>
-            <a:r>
-              <a:rPr lang="en-US" dirty="0" smtClean="0"/>
-              <a:t>Spotify API for demo catalog</a:t>
+              <a:t>OpenShift</a:t>
             </a:r>
             <a:endParaRPr lang="en-US" dirty="0"/>
           </a:p>
@@ -6566,6 +6694,13 @@
   <p:clrMapOvr>
     <a:masterClrMapping/>
   </p:clrMapOvr>
+  <p:timing>
+    <p:tnLst>
+      <p:par>
+        <p:cTn id="1" dur="indefinite" restart="never" nodeType="tmRoot"/>
+      </p:par>
+    </p:tnLst>
+  </p:timing>
 </p:sld>
 </file>
 
@@ -6624,10 +6759,44 @@
           <a:bodyPr/>
           <a:lstStyle/>
           <a:p>
-            <a:endParaRPr lang="en-US"/>
-          </a:p>
-        </p:txBody>
-      </p:sp>
+            <a:r>
+              <a:rPr lang="en-US" dirty="0"/>
+              <a:t>http://</a:t>
+            </a:r>
+            <a:r>
+              <a:rPr lang="en-US" dirty="0" smtClean="0"/>
+              <a:t>cs3200project-myneu.rhcloud.com/public/index.html</a:t>
+            </a:r>
+            <a:endParaRPr lang="en-US" dirty="0"/>
+          </a:p>
+        </p:txBody>
+      </p:sp>
+      <p:pic>
+        <p:nvPicPr>
+          <p:cNvPr id="5" name="Picture 4">
+            <a:hlinkClick r:id="rId2"/>
+          </p:cNvPr>
+          <p:cNvPicPr>
+            <a:picLocks noChangeAspect="1"/>
+          </p:cNvPicPr>
+          <p:nvPr/>
+        </p:nvPicPr>
+        <p:blipFill>
+          <a:blip r:embed="rId3"/>
+          <a:stretch>
+            <a:fillRect/>
+          </a:stretch>
+        </p:blipFill>
+        <p:spPr>
+          <a:xfrm>
+            <a:off x="1720573" y="2458528"/>
+            <a:ext cx="7712017" cy="3641066"/>
+          </a:xfrm>
+          <a:prstGeom prst="rect">
+            <a:avLst/>
+          </a:prstGeom>
+        </p:spPr>
+      </p:pic>
     </p:spTree>
     <p:extLst>
       <p:ext uri="{BB962C8B-B14F-4D97-AF65-F5344CB8AC3E}">
@@ -6638,6 +6807,13 @@
   <p:clrMapOvr>
     <a:masterClrMapping/>
   </p:clrMapOvr>
+  <p:timing>
+    <p:tnLst>
+      <p:par>
+        <p:cTn id="1" dur="indefinite" restart="never" nodeType="tmRoot"/>
+      </p:par>
+    </p:tnLst>
+  </p:timing>
 </p:sld>
 </file>
 

</xml_diff>